<commit_message>
Data Science from the lens of an expert
</commit_message>
<xml_diff>
--- a/Webinar/11 UpGrad - Expert Hacks - Cracking the Data Science Interview/Expert Hacks - Cracking the Data Science Interviews.pptx
+++ b/Webinar/11 UpGrad - Expert Hacks - Cracking the Data Science Interview/Expert Hacks - Cracking the Data Science Interviews.pptx
@@ -279,7 +279,7 @@
           <a:p>
             <a:fld id="{FEC1E092-1ED1-4761-85D1-EEE54D1D70F3}" type="datetimeFigureOut">
               <a:rPr lang="en-US" smtClean="0"/>
-              <a:t>03-Apr-22</a:t>
+              <a:t>06-May-22</a:t>
             </a:fld>
             <a:endParaRPr lang="en-US" dirty="0"/>
           </a:p>
@@ -1847,7 +1847,7 @@
             <a:fld id="{93B45646-DC20-4B9A-BA6C-96B87E2ABB20}" type="datetimeFigureOut">
               <a:rPr lang="en-US" smtClean="0"/>
               <a:pPr/>
-              <a:t>03-Apr-22</a:t>
+              <a:t>06-May-22</a:t>
             </a:fld>
             <a:endParaRPr lang="en-US" dirty="0"/>
           </a:p>
@@ -2146,7 +2146,7 @@
             <a:fld id="{93B45646-DC20-4B9A-BA6C-96B87E2ABB20}" type="datetimeFigureOut">
               <a:rPr lang="en-US" smtClean="0"/>
               <a:pPr/>
-              <a:t>03-Apr-22</a:t>
+              <a:t>06-May-22</a:t>
             </a:fld>
             <a:endParaRPr lang="en-US" dirty="0"/>
           </a:p>
@@ -2479,7 +2479,7 @@
             <a:fld id="{93B45646-DC20-4B9A-BA6C-96B87E2ABB20}" type="datetimeFigureOut">
               <a:rPr lang="en-US" smtClean="0"/>
               <a:pPr/>
-              <a:t>03-Apr-22</a:t>
+              <a:t>06-May-22</a:t>
             </a:fld>
             <a:endParaRPr lang="en-US" dirty="0"/>
           </a:p>
@@ -2874,7 +2874,7 @@
             <a:fld id="{93B45646-DC20-4B9A-BA6C-96B87E2ABB20}" type="datetimeFigureOut">
               <a:rPr lang="en-US" smtClean="0"/>
               <a:pPr/>
-              <a:t>03-Apr-22</a:t>
+              <a:t>06-May-22</a:t>
             </a:fld>
             <a:endParaRPr lang="en-US" dirty="0"/>
           </a:p>
@@ -3423,7 +3423,7 @@
             <a:fld id="{93B45646-DC20-4B9A-BA6C-96B87E2ABB20}" type="datetimeFigureOut">
               <a:rPr lang="en-US" smtClean="0"/>
               <a:pPr/>
-              <a:t>03-Apr-22</a:t>
+              <a:t>06-May-22</a:t>
             </a:fld>
             <a:endParaRPr lang="en-US" dirty="0"/>
           </a:p>
@@ -3626,7 +3626,7 @@
             <a:fld id="{93B45646-DC20-4B9A-BA6C-96B87E2ABB20}" type="datetimeFigureOut">
               <a:rPr lang="en-US" smtClean="0"/>
               <a:pPr/>
-              <a:t>03-Apr-22</a:t>
+              <a:t>06-May-22</a:t>
             </a:fld>
             <a:endParaRPr lang="en-US" dirty="0"/>
           </a:p>
@@ -3786,7 +3786,7 @@
             <a:fld id="{93B45646-DC20-4B9A-BA6C-96B87E2ABB20}" type="datetimeFigureOut">
               <a:rPr lang="en-US" smtClean="0"/>
               <a:pPr/>
-              <a:t>03-Apr-22</a:t>
+              <a:t>06-May-22</a:t>
             </a:fld>
             <a:endParaRPr lang="en-US" dirty="0"/>
           </a:p>

</xml_diff>